<commit_message>
submit changes vite lib intro
</commit_message>
<xml_diff>
--- a/03-bundling/07-vite-lib/00-teoría/Creando librerías con Vite.pptx
+++ b/03-bundling/07-vite-lib/00-teoría/Creando librerías con Vite.pptx
@@ -315,7 +315,7 @@
       </p15:sldGuideLst>
     </p:ext>
     <p:ext uri="http://customooxmlschemas.google.com/">
-      <go:slidesCustomData xmlns:go="http://customooxmlschemas.google.com/" xmlns:ahyp="http://schemas.microsoft.com/office/drawing/2018/hyperlinkcolor" xmlns:p15="http://schemas.microsoft.com/office/powerpoint/2012/main" xmlns:p14="http://schemas.microsoft.com/office/powerpoint/2010/main" xmlns:com="http://schemas.openxmlformats.org/drawingml/2006/compatibility" xmlns:pvml="urn:schemas-microsoft-com:office:powerpoint" xmlns:v="urn:schemas-microsoft-com:vml" xmlns:o="urn:schemas-microsoft-com:office:office" xmlns:dgm="http://schemas.openxmlformats.org/drawingml/2006/diagram" xmlns:c="http://schemas.openxmlformats.org/drawingml/2006/chart" xmlns:mv="urn:schemas-microsoft-com:mac:vml" xmlns:mc="http://schemas.openxmlformats.org/markup-compatibility/2006" xmlns="" r:id="rId40" roundtripDataSignature="AMtx7mhrNPmTgZHa7K1yj3rRNKBZC0AtBg=="/>
+      <go:slidesCustomData xmlns="" xmlns:mc="http://schemas.openxmlformats.org/markup-compatibility/2006" xmlns:mv="urn:schemas-microsoft-com:mac:vml" xmlns:c="http://schemas.openxmlformats.org/drawingml/2006/chart" xmlns:dgm="http://schemas.openxmlformats.org/drawingml/2006/diagram" xmlns:o="urn:schemas-microsoft-com:office:office" xmlns:v="urn:schemas-microsoft-com:vml" xmlns:pvml="urn:schemas-microsoft-com:office:powerpoint" xmlns:com="http://schemas.openxmlformats.org/drawingml/2006/compatibility" xmlns:p14="http://schemas.microsoft.com/office/powerpoint/2010/main" xmlns:p15="http://schemas.microsoft.com/office/powerpoint/2012/main" xmlns:ahyp="http://schemas.microsoft.com/office/drawing/2018/hyperlinkcolor" xmlns:go="http://customooxmlschemas.google.com/" r:id="rId40" roundtripDataSignature="AMtx7mhrNPmTgZHa7K1yj3rRNKBZC0AtBg=="/>
     </p:ext>
   </p:extLst>
 </p:presentation>
@@ -16518,7 +16518,7 @@
           </a:ln>
           <a:extLst>
             <a:ext uri="{C572A759-6A51-4108-AA02-DFA0A04FC94B}">
-              <ma14:wrappingTextBoxFlag xmlns="" xmlns:m="http://schemas.openxmlformats.org/officeDocument/2006/math" xmlns:a14="http://schemas.microsoft.com/office/drawing/2010/main" xmlns:ma14="http://schemas.microsoft.com/office/mac/drawingml/2011/main" val="1"/>
+              <ma14:wrappingTextBoxFlag xmlns:ma14="http://schemas.microsoft.com/office/mac/drawingml/2011/main" xmlns:a14="http://schemas.microsoft.com/office/drawing/2010/main" xmlns:m="http://schemas.openxmlformats.org/officeDocument/2006/math" xmlns="" val="1"/>
             </a:ext>
           </a:extLst>
         </p:spPr>
@@ -16570,7 +16570,7 @@
           </a:ln>
           <a:extLst>
             <a:ext uri="{C572A759-6A51-4108-AA02-DFA0A04FC94B}">
-              <ma14:wrappingTextBoxFlag xmlns="" xmlns:m="http://schemas.openxmlformats.org/officeDocument/2006/math" xmlns:a14="http://schemas.microsoft.com/office/drawing/2010/main" xmlns:ma14="http://schemas.microsoft.com/office/mac/drawingml/2011/main" val="1"/>
+              <ma14:wrappingTextBoxFlag xmlns:ma14="http://schemas.microsoft.com/office/mac/drawingml/2011/main" xmlns:a14="http://schemas.microsoft.com/office/drawing/2010/main" xmlns:m="http://schemas.openxmlformats.org/officeDocument/2006/math" xmlns="" val="1"/>
             </a:ext>
           </a:extLst>
         </p:spPr>
@@ -17023,7 +17023,7 @@
           <a:effectLst/>
           <a:extLst>
             <a:ext uri="{C572A759-6A51-4108-AA02-DFA0A04FC94B}">
-              <ma14:wrappingTextBoxFlag xmlns:ma14="http://schemas.microsoft.com/office/mac/drawingml/2011/main" xmlns:a14="http://schemas.microsoft.com/office/drawing/2010/main" xmlns:m="http://schemas.openxmlformats.org/officeDocument/2006/math" xmlns="" val="1"/>
+              <ma14:wrappingTextBoxFlag xmlns="" xmlns:m="http://schemas.openxmlformats.org/officeDocument/2006/math" xmlns:a14="http://schemas.microsoft.com/office/drawing/2010/main" xmlns:ma14="http://schemas.microsoft.com/office/mac/drawingml/2011/main" val="1"/>
             </a:ext>
           </a:extLst>
         </p:spPr>
@@ -17083,7 +17083,7 @@
           <a:effectLst/>
           <a:extLst>
             <a:ext uri="{C572A759-6A51-4108-AA02-DFA0A04FC94B}">
-              <ma14:wrappingTextBoxFlag xmlns:ma14="http://schemas.microsoft.com/office/mac/drawingml/2011/main" xmlns:a14="http://schemas.microsoft.com/office/drawing/2010/main" xmlns:m="http://schemas.openxmlformats.org/officeDocument/2006/math" xmlns="" val="1"/>
+              <ma14:wrappingTextBoxFlag xmlns="" xmlns:m="http://schemas.openxmlformats.org/officeDocument/2006/math" xmlns:a14="http://schemas.microsoft.com/office/drawing/2010/main" xmlns:ma14="http://schemas.microsoft.com/office/mac/drawingml/2011/main" val="1"/>
             </a:ext>
           </a:extLst>
         </p:spPr>
@@ -17151,7 +17151,7 @@
           <a:effectLst/>
           <a:extLst>
             <a:ext uri="{C572A759-6A51-4108-AA02-DFA0A04FC94B}">
-              <ma14:wrappingTextBoxFlag xmlns:ma14="http://schemas.microsoft.com/office/mac/drawingml/2011/main" xmlns:a14="http://schemas.microsoft.com/office/drawing/2010/main" xmlns:m="http://schemas.openxmlformats.org/officeDocument/2006/math" xmlns="" val="1"/>
+              <ma14:wrappingTextBoxFlag xmlns="" xmlns:m="http://schemas.openxmlformats.org/officeDocument/2006/math" xmlns:a14="http://schemas.microsoft.com/office/drawing/2010/main" xmlns:ma14="http://schemas.microsoft.com/office/mac/drawingml/2011/main" val="1"/>
             </a:ext>
           </a:extLst>
         </p:spPr>
@@ -17211,7 +17211,7 @@
           <a:effectLst/>
           <a:extLst>
             <a:ext uri="{C572A759-6A51-4108-AA02-DFA0A04FC94B}">
-              <ma14:wrappingTextBoxFlag xmlns:ma14="http://schemas.microsoft.com/office/mac/drawingml/2011/main" xmlns:a14="http://schemas.microsoft.com/office/drawing/2010/main" xmlns:m="http://schemas.openxmlformats.org/officeDocument/2006/math" xmlns="" val="1"/>
+              <ma14:wrappingTextBoxFlag xmlns="" xmlns:m="http://schemas.openxmlformats.org/officeDocument/2006/math" xmlns:a14="http://schemas.microsoft.com/office/drawing/2010/main" xmlns:ma14="http://schemas.microsoft.com/office/mac/drawingml/2011/main" val="1"/>
             </a:ext>
           </a:extLst>
         </p:spPr>
@@ -17377,7 +17377,7 @@
           </a:ln>
           <a:extLst>
             <a:ext uri="{C572A759-6A51-4108-AA02-DFA0A04FC94B}">
-              <ma14:wrappingTextBoxFlag xmlns:ma14="http://schemas.microsoft.com/office/mac/drawingml/2011/main" xmlns:a14="http://schemas.microsoft.com/office/drawing/2010/main" xmlns:m="http://schemas.openxmlformats.org/officeDocument/2006/math" xmlns="" val="1"/>
+              <ma14:wrappingTextBoxFlag xmlns="" xmlns:m="http://schemas.openxmlformats.org/officeDocument/2006/math" xmlns:a14="http://schemas.microsoft.com/office/drawing/2010/main" xmlns:ma14="http://schemas.microsoft.com/office/mac/drawingml/2011/main" val="1"/>
             </a:ext>
           </a:extLst>
         </p:spPr>
@@ -17648,7 +17648,7 @@
             <a:effectLst/>
             <a:extLst>
               <a:ext uri="{C572A759-6A51-4108-AA02-DFA0A04FC94B}">
-                <ma14:wrappingTextBoxFlag xmlns:ma14="http://schemas.microsoft.com/office/mac/drawingml/2011/main" xmlns:a14="http://schemas.microsoft.com/office/drawing/2010/main" xmlns:m="http://schemas.openxmlformats.org/officeDocument/2006/math" xmlns="" val="1"/>
+                <ma14:wrappingTextBoxFlag xmlns="" xmlns:m="http://schemas.openxmlformats.org/officeDocument/2006/math" xmlns:a14="http://schemas.microsoft.com/office/drawing/2010/main" xmlns:ma14="http://schemas.microsoft.com/office/mac/drawingml/2011/main" val="1"/>
               </a:ext>
             </a:extLst>
           </p:spPr>
@@ -17698,7 +17698,7 @@
             <a:effectLst/>
             <a:extLst>
               <a:ext uri="{C572A759-6A51-4108-AA02-DFA0A04FC94B}">
-                <ma14:wrappingTextBoxFlag xmlns:ma14="http://schemas.microsoft.com/office/mac/drawingml/2011/main" xmlns:a14="http://schemas.microsoft.com/office/drawing/2010/main" xmlns:m="http://schemas.openxmlformats.org/officeDocument/2006/math" xmlns="" val="1"/>
+                <ma14:wrappingTextBoxFlag xmlns="" xmlns:m="http://schemas.openxmlformats.org/officeDocument/2006/math" xmlns:a14="http://schemas.microsoft.com/office/drawing/2010/main" xmlns:ma14="http://schemas.microsoft.com/office/mac/drawingml/2011/main" val="1"/>
               </a:ext>
             </a:extLst>
           </p:spPr>
@@ -17748,7 +17748,7 @@
             <a:effectLst/>
             <a:extLst>
               <a:ext uri="{C572A759-6A51-4108-AA02-DFA0A04FC94B}">
-                <ma14:wrappingTextBoxFlag xmlns:ma14="http://schemas.microsoft.com/office/mac/drawingml/2011/main" xmlns:a14="http://schemas.microsoft.com/office/drawing/2010/main" xmlns:m="http://schemas.openxmlformats.org/officeDocument/2006/math" xmlns="" val="1"/>
+                <ma14:wrappingTextBoxFlag xmlns="" xmlns:m="http://schemas.openxmlformats.org/officeDocument/2006/math" xmlns:a14="http://schemas.microsoft.com/office/drawing/2010/main" xmlns:ma14="http://schemas.microsoft.com/office/mac/drawingml/2011/main" val="1"/>
               </a:ext>
             </a:extLst>
           </p:spPr>
@@ -17798,7 +17798,7 @@
             <a:effectLst/>
             <a:extLst>
               <a:ext uri="{C572A759-6A51-4108-AA02-DFA0A04FC94B}">
-                <ma14:wrappingTextBoxFlag xmlns:ma14="http://schemas.microsoft.com/office/mac/drawingml/2011/main" xmlns:a14="http://schemas.microsoft.com/office/drawing/2010/main" xmlns:m="http://schemas.openxmlformats.org/officeDocument/2006/math" xmlns="" val="1"/>
+                <ma14:wrappingTextBoxFlag xmlns="" xmlns:m="http://schemas.openxmlformats.org/officeDocument/2006/math" xmlns:a14="http://schemas.microsoft.com/office/drawing/2010/main" xmlns:ma14="http://schemas.microsoft.com/office/mac/drawingml/2011/main" val="1"/>
               </a:ext>
             </a:extLst>
           </p:spPr>
@@ -18090,7 +18090,7 @@
           <a:effectLst/>
           <a:extLst>
             <a:ext uri="{C572A759-6A51-4108-AA02-DFA0A04FC94B}">
-              <ma14:wrappingTextBoxFlag xmlns:ma14="http://schemas.microsoft.com/office/mac/drawingml/2011/main" xmlns:a14="http://schemas.microsoft.com/office/drawing/2010/main" xmlns:m="http://schemas.openxmlformats.org/officeDocument/2006/math" xmlns="" val="1"/>
+              <ma14:wrappingTextBoxFlag xmlns="" xmlns:m="http://schemas.openxmlformats.org/officeDocument/2006/math" xmlns:a14="http://schemas.microsoft.com/office/drawing/2010/main" xmlns:ma14="http://schemas.microsoft.com/office/mac/drawingml/2011/main" val="1"/>
             </a:ext>
           </a:extLst>
         </p:spPr>
@@ -18150,7 +18150,7 @@
           <a:effectLst/>
           <a:extLst>
             <a:ext uri="{C572A759-6A51-4108-AA02-DFA0A04FC94B}">
-              <ma14:wrappingTextBoxFlag xmlns:ma14="http://schemas.microsoft.com/office/mac/drawingml/2011/main" xmlns:a14="http://schemas.microsoft.com/office/drawing/2010/main" xmlns:m="http://schemas.openxmlformats.org/officeDocument/2006/math" xmlns="" val="1"/>
+              <ma14:wrappingTextBoxFlag xmlns="" xmlns:m="http://schemas.openxmlformats.org/officeDocument/2006/math" xmlns:a14="http://schemas.microsoft.com/office/drawing/2010/main" xmlns:ma14="http://schemas.microsoft.com/office/mac/drawingml/2011/main" val="1"/>
             </a:ext>
           </a:extLst>
         </p:spPr>
@@ -18210,7 +18210,7 @@
           <a:effectLst/>
           <a:extLst>
             <a:ext uri="{C572A759-6A51-4108-AA02-DFA0A04FC94B}">
-              <ma14:wrappingTextBoxFlag xmlns:ma14="http://schemas.microsoft.com/office/mac/drawingml/2011/main" xmlns:a14="http://schemas.microsoft.com/office/drawing/2010/main" xmlns:m="http://schemas.openxmlformats.org/officeDocument/2006/math" xmlns="" val="1"/>
+              <ma14:wrappingTextBoxFlag xmlns="" xmlns:m="http://schemas.openxmlformats.org/officeDocument/2006/math" xmlns:a14="http://schemas.microsoft.com/office/drawing/2010/main" xmlns:ma14="http://schemas.microsoft.com/office/mac/drawingml/2011/main" val="1"/>
             </a:ext>
           </a:extLst>
         </p:spPr>
@@ -19325,7 +19325,7 @@
           </a:ln>
           <a:extLst>
             <a:ext uri="{C572A759-6A51-4108-AA02-DFA0A04FC94B}">
-              <ma14:wrappingTextBoxFlag xmlns:ma14="http://schemas.microsoft.com/office/mac/drawingml/2011/main" xmlns:a14="http://schemas.microsoft.com/office/drawing/2010/main" xmlns:m="http://schemas.openxmlformats.org/officeDocument/2006/math" xmlns="" val="1"/>
+              <ma14:wrappingTextBoxFlag xmlns="" xmlns:m="http://schemas.openxmlformats.org/officeDocument/2006/math" xmlns:a14="http://schemas.microsoft.com/office/drawing/2010/main" xmlns:ma14="http://schemas.microsoft.com/office/mac/drawingml/2011/main" val="1"/>
             </a:ext>
           </a:extLst>
         </p:spPr>
@@ -19387,7 +19387,7 @@
           </a:ln>
           <a:extLst>
             <a:ext uri="{C572A759-6A51-4108-AA02-DFA0A04FC94B}">
-              <ma14:wrappingTextBoxFlag xmlns:ma14="http://schemas.microsoft.com/office/mac/drawingml/2011/main" xmlns:a14="http://schemas.microsoft.com/office/drawing/2010/main" xmlns:m="http://schemas.openxmlformats.org/officeDocument/2006/math" xmlns="" val="1"/>
+              <ma14:wrappingTextBoxFlag xmlns="" xmlns:m="http://schemas.openxmlformats.org/officeDocument/2006/math" xmlns:a14="http://schemas.microsoft.com/office/drawing/2010/main" xmlns:ma14="http://schemas.microsoft.com/office/mac/drawingml/2011/main" val="1"/>
             </a:ext>
           </a:extLst>
         </p:spPr>
@@ -21199,7 +21199,7 @@
           </a:ln>
           <a:extLst>
             <a:ext uri="{C572A759-6A51-4108-AA02-DFA0A04FC94B}">
-              <ma14:wrappingTextBoxFlag xmlns:ma14="http://schemas.microsoft.com/office/mac/drawingml/2011/main" xmlns:a14="http://schemas.microsoft.com/office/drawing/2010/main" xmlns:m="http://schemas.openxmlformats.org/officeDocument/2006/math" xmlns="" val="1"/>
+              <ma14:wrappingTextBoxFlag xmlns="" xmlns:m="http://schemas.openxmlformats.org/officeDocument/2006/math" xmlns:a14="http://schemas.microsoft.com/office/drawing/2010/main" xmlns:ma14="http://schemas.microsoft.com/office/mac/drawingml/2011/main" val="1"/>
             </a:ext>
           </a:extLst>
         </p:spPr>
@@ -21265,7 +21265,7 @@
           </a:ln>
           <a:extLst>
             <a:ext uri="{C572A759-6A51-4108-AA02-DFA0A04FC94B}">
-              <ma14:wrappingTextBoxFlag xmlns:ma14="http://schemas.microsoft.com/office/mac/drawingml/2011/main" xmlns:a14="http://schemas.microsoft.com/office/drawing/2010/main" xmlns:m="http://schemas.openxmlformats.org/officeDocument/2006/math" xmlns="" val="1"/>
+              <ma14:wrappingTextBoxFlag xmlns="" xmlns:m="http://schemas.openxmlformats.org/officeDocument/2006/math" xmlns:a14="http://schemas.microsoft.com/office/drawing/2010/main" xmlns:ma14="http://schemas.microsoft.com/office/mac/drawingml/2011/main" val="1"/>
             </a:ext>
           </a:extLst>
         </p:spPr>
@@ -22477,7 +22477,7 @@
           </a:ln>
           <a:extLst>
             <a:ext uri="{C572A759-6A51-4108-AA02-DFA0A04FC94B}">
-              <ma14:wrappingTextBoxFlag xmlns:ma14="http://schemas.microsoft.com/office/mac/drawingml/2011/main" xmlns:a14="http://schemas.microsoft.com/office/drawing/2010/main" xmlns:m="http://schemas.openxmlformats.org/officeDocument/2006/math" xmlns="" val="1"/>
+              <ma14:wrappingTextBoxFlag xmlns="" xmlns:m="http://schemas.openxmlformats.org/officeDocument/2006/math" xmlns:a14="http://schemas.microsoft.com/office/drawing/2010/main" xmlns:ma14="http://schemas.microsoft.com/office/mac/drawingml/2011/main" val="1"/>
             </a:ext>
           </a:extLst>
         </p:spPr>
@@ -22544,7 +22544,7 @@
           <a:effectLst/>
           <a:extLst>
             <a:ext uri="{C572A759-6A51-4108-AA02-DFA0A04FC94B}">
-              <ma14:wrappingTextBoxFlag xmlns:ma14="http://schemas.microsoft.com/office/mac/drawingml/2011/main" xmlns:a14="http://schemas.microsoft.com/office/drawing/2010/main" xmlns:m="http://schemas.openxmlformats.org/officeDocument/2006/math" xmlns="" val="1"/>
+              <ma14:wrappingTextBoxFlag xmlns="" xmlns:m="http://schemas.openxmlformats.org/officeDocument/2006/math" xmlns:a14="http://schemas.microsoft.com/office/drawing/2010/main" xmlns:ma14="http://schemas.microsoft.com/office/mac/drawingml/2011/main" val="1"/>
             </a:ext>
           </a:extLst>
         </p:spPr>
@@ -22608,7 +22608,7 @@
           <a:effectLst/>
           <a:extLst>
             <a:ext uri="{C572A759-6A51-4108-AA02-DFA0A04FC94B}">
-              <ma14:wrappingTextBoxFlag xmlns:ma14="http://schemas.microsoft.com/office/mac/drawingml/2011/main" xmlns:a14="http://schemas.microsoft.com/office/drawing/2010/main" xmlns:m="http://schemas.openxmlformats.org/officeDocument/2006/math" xmlns="" val="1"/>
+              <ma14:wrappingTextBoxFlag xmlns="" xmlns:m="http://schemas.openxmlformats.org/officeDocument/2006/math" xmlns:a14="http://schemas.microsoft.com/office/drawing/2010/main" xmlns:ma14="http://schemas.microsoft.com/office/mac/drawingml/2011/main" val="1"/>
             </a:ext>
           </a:extLst>
         </p:spPr>
@@ -22668,7 +22668,7 @@
           <a:effectLst/>
           <a:extLst>
             <a:ext uri="{C572A759-6A51-4108-AA02-DFA0A04FC94B}">
-              <ma14:wrappingTextBoxFlag xmlns:ma14="http://schemas.microsoft.com/office/mac/drawingml/2011/main" xmlns:a14="http://schemas.microsoft.com/office/drawing/2010/main" xmlns:m="http://schemas.openxmlformats.org/officeDocument/2006/math" xmlns="" val="1"/>
+              <ma14:wrappingTextBoxFlag xmlns="" xmlns:m="http://schemas.openxmlformats.org/officeDocument/2006/math" xmlns:a14="http://schemas.microsoft.com/office/drawing/2010/main" xmlns:ma14="http://schemas.microsoft.com/office/mac/drawingml/2011/main" val="1"/>
             </a:ext>
           </a:extLst>
         </p:spPr>
@@ -24374,7 +24374,7 @@
           <a:effectLst/>
           <a:extLst>
             <a:ext uri="{C572A759-6A51-4108-AA02-DFA0A04FC94B}">
-              <ma14:wrappingTextBoxFlag xmlns:ma14="http://schemas.microsoft.com/office/mac/drawingml/2011/main" xmlns:a14="http://schemas.microsoft.com/office/drawing/2010/main" xmlns:m="http://schemas.openxmlformats.org/officeDocument/2006/math" xmlns="" val="1"/>
+              <ma14:wrappingTextBoxFlag xmlns="" xmlns:m="http://schemas.openxmlformats.org/officeDocument/2006/math" xmlns:a14="http://schemas.microsoft.com/office/drawing/2010/main" xmlns:ma14="http://schemas.microsoft.com/office/mac/drawingml/2011/main" val="1"/>
             </a:ext>
           </a:extLst>
         </p:spPr>
@@ -24434,7 +24434,7 @@
           <a:effectLst/>
           <a:extLst>
             <a:ext uri="{C572A759-6A51-4108-AA02-DFA0A04FC94B}">
-              <ma14:wrappingTextBoxFlag xmlns:ma14="http://schemas.microsoft.com/office/mac/drawingml/2011/main" xmlns:a14="http://schemas.microsoft.com/office/drawing/2010/main" xmlns:m="http://schemas.openxmlformats.org/officeDocument/2006/math" xmlns="" val="1"/>
+              <ma14:wrappingTextBoxFlag xmlns="" xmlns:m="http://schemas.openxmlformats.org/officeDocument/2006/math" xmlns:a14="http://schemas.microsoft.com/office/drawing/2010/main" xmlns:ma14="http://schemas.microsoft.com/office/mac/drawingml/2011/main" val="1"/>
             </a:ext>
           </a:extLst>
         </p:spPr>
@@ -24494,7 +24494,7 @@
           <a:effectLst/>
           <a:extLst>
             <a:ext uri="{C572A759-6A51-4108-AA02-DFA0A04FC94B}">
-              <ma14:wrappingTextBoxFlag xmlns:ma14="http://schemas.microsoft.com/office/mac/drawingml/2011/main" xmlns:a14="http://schemas.microsoft.com/office/drawing/2010/main" xmlns:m="http://schemas.openxmlformats.org/officeDocument/2006/math" xmlns="" val="1"/>
+              <ma14:wrappingTextBoxFlag xmlns="" xmlns:m="http://schemas.openxmlformats.org/officeDocument/2006/math" xmlns:a14="http://schemas.microsoft.com/office/drawing/2010/main" xmlns:ma14="http://schemas.microsoft.com/office/mac/drawingml/2011/main" val="1"/>
             </a:ext>
           </a:extLst>
         </p:spPr>
@@ -24554,7 +24554,7 @@
           <a:effectLst/>
           <a:extLst>
             <a:ext uri="{C572A759-6A51-4108-AA02-DFA0A04FC94B}">
-              <ma14:wrappingTextBoxFlag xmlns:ma14="http://schemas.microsoft.com/office/mac/drawingml/2011/main" xmlns:a14="http://schemas.microsoft.com/office/drawing/2010/main" xmlns:m="http://schemas.openxmlformats.org/officeDocument/2006/math" xmlns="" val="1"/>
+              <ma14:wrappingTextBoxFlag xmlns="" xmlns:m="http://schemas.openxmlformats.org/officeDocument/2006/math" xmlns:a14="http://schemas.microsoft.com/office/drawing/2010/main" xmlns:ma14="http://schemas.microsoft.com/office/mac/drawingml/2011/main" val="1"/>
             </a:ext>
           </a:extLst>
         </p:spPr>
@@ -24614,7 +24614,7 @@
           <a:effectLst/>
           <a:extLst>
             <a:ext uri="{C572A759-6A51-4108-AA02-DFA0A04FC94B}">
-              <ma14:wrappingTextBoxFlag xmlns:ma14="http://schemas.microsoft.com/office/mac/drawingml/2011/main" xmlns:a14="http://schemas.microsoft.com/office/drawing/2010/main" xmlns:m="http://schemas.openxmlformats.org/officeDocument/2006/math" xmlns="" val="1"/>
+              <ma14:wrappingTextBoxFlag xmlns="" xmlns:m="http://schemas.openxmlformats.org/officeDocument/2006/math" xmlns:a14="http://schemas.microsoft.com/office/drawing/2010/main" xmlns:ma14="http://schemas.microsoft.com/office/mac/drawingml/2011/main" val="1"/>
             </a:ext>
           </a:extLst>
         </p:spPr>
@@ -24674,7 +24674,7 @@
           <a:effectLst/>
           <a:extLst>
             <a:ext uri="{C572A759-6A51-4108-AA02-DFA0A04FC94B}">
-              <ma14:wrappingTextBoxFlag xmlns:ma14="http://schemas.microsoft.com/office/mac/drawingml/2011/main" xmlns:a14="http://schemas.microsoft.com/office/drawing/2010/main" xmlns:m="http://schemas.openxmlformats.org/officeDocument/2006/math" xmlns="" val="1"/>
+              <ma14:wrappingTextBoxFlag xmlns="" xmlns:m="http://schemas.openxmlformats.org/officeDocument/2006/math" xmlns:a14="http://schemas.microsoft.com/office/drawing/2010/main" xmlns:ma14="http://schemas.microsoft.com/office/mac/drawingml/2011/main" val="1"/>
             </a:ext>
           </a:extLst>
         </p:spPr>
@@ -24734,7 +24734,7 @@
           <a:effectLst/>
           <a:extLst>
             <a:ext uri="{C572A759-6A51-4108-AA02-DFA0A04FC94B}">
-              <ma14:wrappingTextBoxFlag xmlns:ma14="http://schemas.microsoft.com/office/mac/drawingml/2011/main" xmlns:a14="http://schemas.microsoft.com/office/drawing/2010/main" xmlns:m="http://schemas.openxmlformats.org/officeDocument/2006/math" xmlns="" val="1"/>
+              <ma14:wrappingTextBoxFlag xmlns="" xmlns:m="http://schemas.openxmlformats.org/officeDocument/2006/math" xmlns:a14="http://schemas.microsoft.com/office/drawing/2010/main" xmlns:ma14="http://schemas.microsoft.com/office/mac/drawingml/2011/main" val="1"/>
             </a:ext>
           </a:extLst>
         </p:spPr>
@@ -24794,7 +24794,7 @@
           <a:effectLst/>
           <a:extLst>
             <a:ext uri="{C572A759-6A51-4108-AA02-DFA0A04FC94B}">
-              <ma14:wrappingTextBoxFlag xmlns:ma14="http://schemas.microsoft.com/office/mac/drawingml/2011/main" xmlns:a14="http://schemas.microsoft.com/office/drawing/2010/main" xmlns:m="http://schemas.openxmlformats.org/officeDocument/2006/math" xmlns="" val="1"/>
+              <ma14:wrappingTextBoxFlag xmlns="" xmlns:m="http://schemas.openxmlformats.org/officeDocument/2006/math" xmlns:a14="http://schemas.microsoft.com/office/drawing/2010/main" xmlns:ma14="http://schemas.microsoft.com/office/mac/drawingml/2011/main" val="1"/>
             </a:ext>
           </a:extLst>
         </p:spPr>
@@ -24854,7 +24854,7 @@
           <a:effectLst/>
           <a:extLst>
             <a:ext uri="{C572A759-6A51-4108-AA02-DFA0A04FC94B}">
-              <ma14:wrappingTextBoxFlag xmlns:ma14="http://schemas.microsoft.com/office/mac/drawingml/2011/main" xmlns:a14="http://schemas.microsoft.com/office/drawing/2010/main" xmlns:m="http://schemas.openxmlformats.org/officeDocument/2006/math" xmlns="" val="1"/>
+              <ma14:wrappingTextBoxFlag xmlns="" xmlns:m="http://schemas.openxmlformats.org/officeDocument/2006/math" xmlns:a14="http://schemas.microsoft.com/office/drawing/2010/main" xmlns:ma14="http://schemas.microsoft.com/office/mac/drawingml/2011/main" val="1"/>
             </a:ext>
           </a:extLst>
         </p:spPr>
@@ -24909,7 +24909,7 @@
           </a:ln>
           <a:extLst>
             <a:ext uri="{C572A759-6A51-4108-AA02-DFA0A04FC94B}">
-              <ma14:wrappingTextBoxFlag xmlns:ma14="http://schemas.microsoft.com/office/mac/drawingml/2011/main" xmlns:a14="http://schemas.microsoft.com/office/drawing/2010/main" xmlns:m="http://schemas.openxmlformats.org/officeDocument/2006/math" xmlns="" val="1"/>
+              <ma14:wrappingTextBoxFlag xmlns="" xmlns:m="http://schemas.openxmlformats.org/officeDocument/2006/math" xmlns:a14="http://schemas.microsoft.com/office/drawing/2010/main" xmlns:ma14="http://schemas.microsoft.com/office/mac/drawingml/2011/main" val="1"/>
             </a:ext>
           </a:extLst>
         </p:spPr>
@@ -24976,7 +24976,7 @@
           <a:effectLst/>
           <a:extLst>
             <a:ext uri="{C572A759-6A51-4108-AA02-DFA0A04FC94B}">
-              <ma14:wrappingTextBoxFlag xmlns:ma14="http://schemas.microsoft.com/office/mac/drawingml/2011/main" xmlns:a14="http://schemas.microsoft.com/office/drawing/2010/main" xmlns:m="http://schemas.openxmlformats.org/officeDocument/2006/math" xmlns="" val="1"/>
+              <ma14:wrappingTextBoxFlag xmlns="" xmlns:m="http://schemas.openxmlformats.org/officeDocument/2006/math" xmlns:a14="http://schemas.microsoft.com/office/drawing/2010/main" xmlns:ma14="http://schemas.microsoft.com/office/mac/drawingml/2011/main" val="1"/>
             </a:ext>
           </a:extLst>
         </p:spPr>
@@ -26599,7 +26599,7 @@
           </a:ln>
           <a:extLst>
             <a:ext uri="{C572A759-6A51-4108-AA02-DFA0A04FC94B}">
-              <ma14:wrappingTextBoxFlag xmlns:ma14="http://schemas.microsoft.com/office/mac/drawingml/2011/main" xmlns:a14="http://schemas.microsoft.com/office/drawing/2010/main" xmlns:m="http://schemas.openxmlformats.org/officeDocument/2006/math" xmlns="" val="1"/>
+              <ma14:wrappingTextBoxFlag xmlns="" xmlns:m="http://schemas.openxmlformats.org/officeDocument/2006/math" xmlns:a14="http://schemas.microsoft.com/office/drawing/2010/main" xmlns:ma14="http://schemas.microsoft.com/office/mac/drawingml/2011/main" val="1"/>
             </a:ext>
           </a:extLst>
         </p:spPr>
@@ -26661,7 +26661,7 @@
           </a:ln>
           <a:extLst>
             <a:ext uri="{C572A759-6A51-4108-AA02-DFA0A04FC94B}">
-              <ma14:wrappingTextBoxFlag xmlns:ma14="http://schemas.microsoft.com/office/mac/drawingml/2011/main" xmlns:a14="http://schemas.microsoft.com/office/drawing/2010/main" xmlns:m="http://schemas.openxmlformats.org/officeDocument/2006/math" xmlns="" val="1"/>
+              <ma14:wrappingTextBoxFlag xmlns="" xmlns:m="http://schemas.openxmlformats.org/officeDocument/2006/math" xmlns:a14="http://schemas.microsoft.com/office/drawing/2010/main" xmlns:ma14="http://schemas.microsoft.com/office/mac/drawingml/2011/main" val="1"/>
             </a:ext>
           </a:extLst>
         </p:spPr>
@@ -26828,7 +26828,7 @@
             <a:effectLst/>
             <a:extLst>
               <a:ext uri="{C572A759-6A51-4108-AA02-DFA0A04FC94B}">
-                <ma14:wrappingTextBoxFlag xmlns:ma14="http://schemas.microsoft.com/office/mac/drawingml/2011/main" xmlns:a14="http://schemas.microsoft.com/office/drawing/2010/main" xmlns:m="http://schemas.openxmlformats.org/officeDocument/2006/math" xmlns="" val="1"/>
+                <ma14:wrappingTextBoxFlag xmlns="" xmlns:m="http://schemas.openxmlformats.org/officeDocument/2006/math" xmlns:a14="http://schemas.microsoft.com/office/drawing/2010/main" xmlns:ma14="http://schemas.microsoft.com/office/mac/drawingml/2011/main" val="1"/>
               </a:ext>
             </a:extLst>
           </p:spPr>
@@ -26901,7 +26901,7 @@
             <a:effectLst/>
             <a:extLst>
               <a:ext uri="{C572A759-6A51-4108-AA02-DFA0A04FC94B}">
-                <ma14:wrappingTextBoxFlag xmlns:ma14="http://schemas.microsoft.com/office/mac/drawingml/2011/main" xmlns:a14="http://schemas.microsoft.com/office/drawing/2010/main" xmlns:m="http://schemas.openxmlformats.org/officeDocument/2006/math" xmlns="" val="1"/>
+                <ma14:wrappingTextBoxFlag xmlns="" xmlns:m="http://schemas.openxmlformats.org/officeDocument/2006/math" xmlns:a14="http://schemas.microsoft.com/office/drawing/2010/main" xmlns:ma14="http://schemas.microsoft.com/office/mac/drawingml/2011/main" val="1"/>
               </a:ext>
             </a:extLst>
           </p:spPr>
@@ -26974,7 +26974,7 @@
             <a:effectLst/>
             <a:extLst>
               <a:ext uri="{C572A759-6A51-4108-AA02-DFA0A04FC94B}">
-                <ma14:wrappingTextBoxFlag xmlns:ma14="http://schemas.microsoft.com/office/mac/drawingml/2011/main" xmlns:a14="http://schemas.microsoft.com/office/drawing/2010/main" xmlns:m="http://schemas.openxmlformats.org/officeDocument/2006/math" xmlns="" val="1"/>
+                <ma14:wrappingTextBoxFlag xmlns="" xmlns:m="http://schemas.openxmlformats.org/officeDocument/2006/math" xmlns:a14="http://schemas.microsoft.com/office/drawing/2010/main" xmlns:ma14="http://schemas.microsoft.com/office/mac/drawingml/2011/main" val="1"/>
               </a:ext>
             </a:extLst>
           </p:spPr>
@@ -27047,7 +27047,7 @@
             <a:effectLst/>
             <a:extLst>
               <a:ext uri="{C572A759-6A51-4108-AA02-DFA0A04FC94B}">
-                <ma14:wrappingTextBoxFlag xmlns:ma14="http://schemas.microsoft.com/office/mac/drawingml/2011/main" xmlns:a14="http://schemas.microsoft.com/office/drawing/2010/main" xmlns:m="http://schemas.openxmlformats.org/officeDocument/2006/math" xmlns="" val="1"/>
+                <ma14:wrappingTextBoxFlag xmlns="" xmlns:m="http://schemas.openxmlformats.org/officeDocument/2006/math" xmlns:a14="http://schemas.microsoft.com/office/drawing/2010/main" xmlns:ma14="http://schemas.microsoft.com/office/mac/drawingml/2011/main" val="1"/>
               </a:ext>
             </a:extLst>
           </p:spPr>
@@ -27120,7 +27120,7 @@
             <a:effectLst/>
             <a:extLst>
               <a:ext uri="{C572A759-6A51-4108-AA02-DFA0A04FC94B}">
-                <ma14:wrappingTextBoxFlag xmlns:ma14="http://schemas.microsoft.com/office/mac/drawingml/2011/main" xmlns:a14="http://schemas.microsoft.com/office/drawing/2010/main" xmlns:m="http://schemas.openxmlformats.org/officeDocument/2006/math" xmlns="" val="1"/>
+                <ma14:wrappingTextBoxFlag xmlns="" xmlns:m="http://schemas.openxmlformats.org/officeDocument/2006/math" xmlns:a14="http://schemas.microsoft.com/office/drawing/2010/main" xmlns:ma14="http://schemas.microsoft.com/office/mac/drawingml/2011/main" val="1"/>
               </a:ext>
             </a:extLst>
           </p:spPr>
@@ -27193,7 +27193,7 @@
             <a:effectLst/>
             <a:extLst>
               <a:ext uri="{C572A759-6A51-4108-AA02-DFA0A04FC94B}">
-                <ma14:wrappingTextBoxFlag xmlns:ma14="http://schemas.microsoft.com/office/mac/drawingml/2011/main" xmlns:a14="http://schemas.microsoft.com/office/drawing/2010/main" xmlns:m="http://schemas.openxmlformats.org/officeDocument/2006/math" xmlns="" val="1"/>
+                <ma14:wrappingTextBoxFlag xmlns="" xmlns:m="http://schemas.openxmlformats.org/officeDocument/2006/math" xmlns:a14="http://schemas.microsoft.com/office/drawing/2010/main" xmlns:ma14="http://schemas.microsoft.com/office/mac/drawingml/2011/main" val="1"/>
               </a:ext>
             </a:extLst>
           </p:spPr>
@@ -27351,7 +27351,7 @@
           </a:ln>
           <a:extLst>
             <a:ext uri="{C572A759-6A51-4108-AA02-DFA0A04FC94B}">
-              <ma14:wrappingTextBoxFlag xmlns:ma14="http://schemas.microsoft.com/office/mac/drawingml/2011/main" xmlns:a14="http://schemas.microsoft.com/office/drawing/2010/main" xmlns:m="http://schemas.openxmlformats.org/officeDocument/2006/math" xmlns="" val="1"/>
+              <ma14:wrappingTextBoxFlag xmlns="" xmlns:m="http://schemas.openxmlformats.org/officeDocument/2006/math" xmlns:a14="http://schemas.microsoft.com/office/drawing/2010/main" xmlns:ma14="http://schemas.microsoft.com/office/mac/drawingml/2011/main" val="1"/>
             </a:ext>
           </a:extLst>
         </p:spPr>

</xml_diff>